<commit_message>
Added a browser support page for Joseph :P
</commit_message>
<xml_diff>
--- a/documents/Prototype Presentation.pptx
+++ b/documents/Prototype Presentation.pptx
@@ -5,16 +5,17 @@
     <p:sldMasterId id="2147483648" r:id="rId1"/>
   </p:sldMasterIdLst>
   <p:handoutMasterIdLst>
-    <p:handoutMasterId r:id="rId9"/>
+    <p:handoutMasterId r:id="rId10"/>
   </p:handoutMasterIdLst>
   <p:sldIdLst>
     <p:sldId id="256" r:id="rId2"/>
     <p:sldId id="262" r:id="rId3"/>
     <p:sldId id="257" r:id="rId4"/>
-    <p:sldId id="258" r:id="rId5"/>
-    <p:sldId id="260" r:id="rId6"/>
-    <p:sldId id="261" r:id="rId7"/>
-    <p:sldId id="259" r:id="rId8"/>
+    <p:sldId id="263" r:id="rId5"/>
+    <p:sldId id="258" r:id="rId6"/>
+    <p:sldId id="260" r:id="rId7"/>
+    <p:sldId id="261" r:id="rId8"/>
+    <p:sldId id="259" r:id="rId9"/>
   </p:sldIdLst>
   <p:sldSz cx="9144000" cy="6858000" type="screen4x3"/>
   <p:notesSz cx="6858000" cy="9144000"/>
@@ -4120,27 +4121,15 @@
           <a:lstStyle/>
           <a:p>
             <a:r>
-              <a:rPr lang="en-US" dirty="0" smtClean="0">
-                <a:solidFill>
-                  <a:srgbClr val="FF9900"/>
-                </a:solidFill>
-              </a:rPr>
+              <a:rPr lang="en-US" dirty="0" smtClean="0"/>
               <a:t>Charles </a:t>
             </a:r>
             <a:r>
-              <a:rPr lang="en-US" dirty="0" err="1" smtClean="0">
-                <a:solidFill>
-                  <a:srgbClr val="FF9900"/>
-                </a:solidFill>
-              </a:rPr>
+              <a:rPr lang="en-US" dirty="0" err="1" smtClean="0"/>
               <a:t>Madere</a:t>
             </a:r>
             <a:r>
-              <a:rPr lang="en-US" dirty="0" smtClean="0">
-                <a:solidFill>
-                  <a:srgbClr val="FF9900"/>
-                </a:solidFill>
-              </a:rPr>
+              <a:rPr lang="en-US" dirty="0" smtClean="0"/>
               <a:t>  </a:t>
             </a:r>
           </a:p>
@@ -4149,21 +4138,13 @@
               <a:buNone/>
             </a:pPr>
             <a:r>
-              <a:rPr lang="en-US" dirty="0" smtClean="0">
-                <a:solidFill>
-                  <a:srgbClr val="FF9900"/>
-                </a:solidFill>
-              </a:rPr>
+              <a:rPr lang="en-US" dirty="0" smtClean="0"/>
               <a:t>	</a:t>
             </a:r>
           </a:p>
           <a:p>
             <a:r>
-              <a:rPr lang="en-US" dirty="0" smtClean="0">
-                <a:solidFill>
-                  <a:srgbClr val="FF9900"/>
-                </a:solidFill>
-              </a:rPr>
+              <a:rPr lang="en-US" dirty="0" smtClean="0"/>
               <a:t>Joseph Gautier</a:t>
             </a:r>
           </a:p>
@@ -4172,82 +4153,42 @@
               <a:buNone/>
             </a:pPr>
             <a:r>
-              <a:rPr lang="en-US" dirty="0" smtClean="0">
-                <a:solidFill>
-                  <a:srgbClr val="FF9900"/>
-                </a:solidFill>
-              </a:rPr>
+              <a:rPr lang="en-US" dirty="0" smtClean="0"/>
               <a:t> </a:t>
             </a:r>
           </a:p>
           <a:p>
             <a:r>
-              <a:rPr lang="en-US" dirty="0" err="1" smtClean="0">
-                <a:solidFill>
-                  <a:srgbClr val="FF9900"/>
-                </a:solidFill>
-              </a:rPr>
+              <a:rPr lang="en-US" dirty="0" err="1" smtClean="0"/>
               <a:t>Jarrad</a:t>
             </a:r>
             <a:r>
-              <a:rPr lang="en-US" dirty="0" smtClean="0">
-                <a:solidFill>
-                  <a:srgbClr val="FF9900"/>
-                </a:solidFill>
-              </a:rPr>
+              <a:rPr lang="en-US" dirty="0" smtClean="0"/>
               <a:t> </a:t>
             </a:r>
             <a:r>
-              <a:rPr lang="en-US" dirty="0" err="1" smtClean="0">
-                <a:solidFill>
-                  <a:srgbClr val="FF9900"/>
-                </a:solidFill>
-              </a:rPr>
+              <a:rPr lang="en-US" dirty="0" err="1" smtClean="0"/>
               <a:t>Pinestraw</a:t>
             </a:r>
-            <a:endParaRPr lang="en-US" dirty="0" smtClean="0">
-              <a:solidFill>
-                <a:srgbClr val="FF9900"/>
-              </a:solidFill>
-            </a:endParaRPr>
-          </a:p>
-          <a:p>
-            <a:endParaRPr lang="en-US" dirty="0" smtClean="0">
-              <a:solidFill>
-                <a:srgbClr val="FF9900"/>
-              </a:solidFill>
-            </a:endParaRPr>
-          </a:p>
-          <a:p>
-            <a:r>
-              <a:rPr lang="en-US" dirty="0" err="1" smtClean="0">
-                <a:solidFill>
-                  <a:srgbClr val="FF9900"/>
-                </a:solidFill>
-              </a:rPr>
+            <a:endParaRPr lang="en-US" dirty="0" smtClean="0"/>
+          </a:p>
+          <a:p>
+            <a:endParaRPr lang="en-US" dirty="0" smtClean="0"/>
+          </a:p>
+          <a:p>
+            <a:r>
+              <a:rPr lang="en-US" dirty="0" err="1" smtClean="0"/>
               <a:t>Geonathan</a:t>
             </a:r>
             <a:r>
-              <a:rPr lang="en-US" dirty="0" smtClean="0">
-                <a:solidFill>
-                  <a:srgbClr val="FF9900"/>
-                </a:solidFill>
-              </a:rPr>
+              <a:rPr lang="en-US" dirty="0" smtClean="0"/>
               <a:t> </a:t>
             </a:r>
             <a:r>
-              <a:rPr lang="en-US" dirty="0" err="1" smtClean="0">
-                <a:solidFill>
-                  <a:srgbClr val="FF9900"/>
-                </a:solidFill>
-              </a:rPr>
+              <a:rPr lang="en-US" dirty="0" err="1" smtClean="0"/>
               <a:t>Sena</a:t>
             </a:r>
-            <a:endParaRPr lang="en-US" dirty="0">
-              <a:solidFill>
-                <a:srgbClr val="FF9900"/>
-              </a:solidFill>
-            </a:endParaRPr>
+            <a:endParaRPr lang="en-US" dirty="0"/>
           </a:p>
         </p:txBody>
       </p:sp>
@@ -4823,6 +4764,133 @@
       </p:grpSpPr>
       <p:sp>
         <p:nvSpPr>
+          <p:cNvPr id="2" name="Title 1"/>
+          <p:cNvSpPr>
+            <a:spLocks noGrp="1"/>
+          </p:cNvSpPr>
+          <p:nvPr>
+            <p:ph type="title"/>
+          </p:nvPr>
+        </p:nvSpPr>
+        <p:spPr/>
+        <p:txBody>
+          <a:bodyPr>
+            <a:scene3d>
+              <a:camera prst="orthographicFront"/>
+              <a:lightRig rig="glow" dir="t">
+                <a:rot lat="0" lon="0" rev="5400000"/>
+              </a:lightRig>
+            </a:scene3d>
+            <a:sp3d contourW="12700">
+              <a:bevelT w="25400" h="25400"/>
+              <a:extrusionClr>
+                <a:schemeClr val="bg1"/>
+              </a:extrusionClr>
+              <a:contourClr>
+                <a:srgbClr val="FF9900"/>
+              </a:contourClr>
+            </a:sp3d>
+          </a:bodyPr>
+          <a:lstStyle/>
+          <a:p>
+            <a:r>
+              <a:rPr lang="en-US" sz="5400" b="1" dirty="0" smtClean="0">
+                <a:solidFill>
+                  <a:srgbClr val="FF9900"/>
+                </a:solidFill>
+                <a:effectLst>
+                  <a:outerShdw blurRad="60007" dist="200025" dir="15000000" sy="30000" kx="-1800000" algn="bl" rotWithShape="0">
+                    <a:prstClr val="black">
+                      <a:alpha val="32000"/>
+                    </a:prstClr>
+                  </a:outerShdw>
+                </a:effectLst>
+                <a:latin typeface="Calibri" pitchFamily="34" charset="0"/>
+                <a:cs typeface="Calibri" pitchFamily="34" charset="0"/>
+              </a:rPr>
+              <a:t>Browser Support</a:t>
+            </a:r>
+            <a:endParaRPr lang="en-US" sz="5400" b="1" dirty="0">
+              <a:solidFill>
+                <a:srgbClr val="FF9900"/>
+              </a:solidFill>
+              <a:effectLst>
+                <a:outerShdw blurRad="60007" dist="200025" dir="15000000" sy="30000" kx="-1800000" algn="bl" rotWithShape="0">
+                  <a:prstClr val="black">
+                    <a:alpha val="32000"/>
+                  </a:prstClr>
+                </a:outerShdw>
+              </a:effectLst>
+              <a:latin typeface="Calibri" pitchFamily="34" charset="0"/>
+              <a:cs typeface="Calibri" pitchFamily="34" charset="0"/>
+            </a:endParaRPr>
+          </a:p>
+        </p:txBody>
+      </p:sp>
+      <p:sp>
+        <p:nvSpPr>
+          <p:cNvPr id="3" name="Content Placeholder 2"/>
+          <p:cNvSpPr>
+            <a:spLocks noGrp="1"/>
+          </p:cNvSpPr>
+          <p:nvPr>
+            <p:ph idx="1"/>
+          </p:nvPr>
+        </p:nvSpPr>
+        <p:spPr/>
+        <p:txBody>
+          <a:bodyPr/>
+          <a:lstStyle/>
+          <a:p>
+            <a:r>
+              <a:rPr lang="en-US" dirty="0" smtClean="0"/>
+              <a:t>HTML5 features not supported universally</a:t>
+            </a:r>
+          </a:p>
+          <a:p>
+            <a:r>
+              <a:rPr lang="en-US" dirty="0" smtClean="0"/>
+              <a:t>Focus mainly on Chrome</a:t>
+            </a:r>
+          </a:p>
+          <a:p>
+            <a:r>
+              <a:rPr lang="en-US" dirty="0" smtClean="0"/>
+              <a:t>Also supporting: Firefox 7.0.1 and IE9</a:t>
+            </a:r>
+          </a:p>
+          <a:p>
+            <a:endParaRPr lang="en-US" dirty="0"/>
+          </a:p>
+        </p:txBody>
+      </p:sp>
+    </p:spTree>
+  </p:cSld>
+  <p:clrMapOvr>
+    <a:masterClrMapping/>
+  </p:clrMapOvr>
+</p:sld>
+</file>
+
+<file path=ppt/slides/slide5.xml><?xml version="1.0" encoding="utf-8"?>
+<p:sld xmlns:a="http://schemas.openxmlformats.org/drawingml/2006/main" xmlns:r="http://schemas.openxmlformats.org/officeDocument/2006/relationships" xmlns:p="http://schemas.openxmlformats.org/presentationml/2006/main">
+  <p:cSld>
+    <p:spTree>
+      <p:nvGrpSpPr>
+        <p:cNvPr id="1" name=""/>
+        <p:cNvGrpSpPr/>
+        <p:nvPr/>
+      </p:nvGrpSpPr>
+      <p:grpSpPr>
+        <a:xfrm>
+          <a:off x="0" y="0"/>
+          <a:ext cx="0" cy="0"/>
+          <a:chOff x="0" y="0"/>
+          <a:chExt cx="0" cy="0"/>
+        </a:xfrm>
+      </p:grpSpPr>
+      <p:sp>
+        <p:nvSpPr>
           <p:cNvPr id="4098" name="Content Placeholder 2"/>
           <p:cNvSpPr>
             <a:spLocks noGrp="1"/>
@@ -4842,62 +4910,34 @@
           <a:lstStyle/>
           <a:p>
             <a:r>
-              <a:rPr lang="en-US" dirty="0" smtClean="0">
-                <a:solidFill>
-                  <a:srgbClr val="FF9900"/>
-                </a:solidFill>
-              </a:rPr>
+              <a:rPr lang="en-US" dirty="0" smtClean="0"/>
               <a:t>Originally: going to use </a:t>
             </a:r>
             <a:r>
-              <a:rPr lang="en-US" dirty="0" err="1" smtClean="0">
-                <a:solidFill>
-                  <a:srgbClr val="FF9900"/>
-                </a:solidFill>
-              </a:rPr>
+              <a:rPr lang="en-US" dirty="0" err="1" smtClean="0"/>
               <a:t>facebook</a:t>
             </a:r>
             <a:r>
-              <a:rPr lang="en-US" dirty="0" smtClean="0">
-                <a:solidFill>
-                  <a:srgbClr val="FF9900"/>
-                </a:solidFill>
-              </a:rPr>
+              <a:rPr lang="en-US" dirty="0" smtClean="0"/>
               <a:t> chat</a:t>
             </a:r>
           </a:p>
           <a:p>
             <a:r>
-              <a:rPr lang="en-US" dirty="0" smtClean="0">
-                <a:solidFill>
-                  <a:srgbClr val="FF9900"/>
-                </a:solidFill>
-              </a:rPr>
+              <a:rPr lang="en-US" dirty="0" smtClean="0"/>
               <a:t>Instead: create our own web-based chat app</a:t>
             </a:r>
           </a:p>
           <a:p>
             <a:r>
-              <a:rPr lang="en-US" dirty="0" smtClean="0">
-                <a:solidFill>
-                  <a:srgbClr val="FF9900"/>
-                </a:solidFill>
-              </a:rPr>
+              <a:rPr lang="en-US" dirty="0" smtClean="0"/>
               <a:t>Will still use </a:t>
             </a:r>
             <a:r>
-              <a:rPr lang="en-US" dirty="0" err="1" smtClean="0">
-                <a:solidFill>
-                  <a:srgbClr val="FF9900"/>
-                </a:solidFill>
-              </a:rPr>
+              <a:rPr lang="en-US" dirty="0" err="1" smtClean="0"/>
               <a:t>facebook</a:t>
             </a:r>
-            <a:endParaRPr lang="en-US" dirty="0" smtClean="0">
-              <a:solidFill>
-                <a:srgbClr val="FF9900"/>
-              </a:solidFill>
-            </a:endParaRPr>
+            <a:endParaRPr lang="en-US" dirty="0" smtClean="0"/>
           </a:p>
         </p:txBody>
       </p:sp>
@@ -5040,7 +5080,7 @@
 </p:sld>
 </file>
 
-<file path=ppt/slides/slide5.xml><?xml version="1.0" encoding="utf-8"?>
+<file path=ppt/slides/slide6.xml><?xml version="1.0" encoding="utf-8"?>
 <p:sld xmlns:a="http://schemas.openxmlformats.org/drawingml/2006/main" xmlns:r="http://schemas.openxmlformats.org/officeDocument/2006/relationships" xmlns:p="http://schemas.openxmlformats.org/presentationml/2006/main">
   <p:cSld>
     <p:spTree>
@@ -5080,69 +5120,27 @@
           </a:p>
           <a:p>
             <a:r>
-              <a:rPr lang="en-US" dirty="0" smtClean="0">
-                <a:solidFill>
-                  <a:srgbClr val="FF9900"/>
-                </a:solidFill>
-              </a:rPr>
+              <a:rPr lang="en-US" dirty="0" smtClean="0"/>
               <a:t>Saving/exporting the drawn images</a:t>
             </a:r>
           </a:p>
           <a:p>
             <a:r>
-              <a:rPr lang="en-US" dirty="0" smtClean="0">
-                <a:solidFill>
-                  <a:srgbClr val="FF9900"/>
-                </a:solidFill>
-              </a:rPr>
-              <a:t>B</a:t>
-            </a:r>
-            <a:r>
-              <a:rPr lang="en-US" dirty="0" smtClean="0">
-                <a:solidFill>
-                  <a:srgbClr val="FF9900"/>
-                </a:solidFill>
-              </a:rPr>
-              <a:t>asic </a:t>
-            </a:r>
-            <a:r>
-              <a:rPr lang="en-US" dirty="0" smtClean="0">
-                <a:solidFill>
-                  <a:srgbClr val="FF9900"/>
-                </a:solidFill>
-              </a:rPr>
-              <a:t>sounds during certain events</a:t>
-            </a:r>
-          </a:p>
-          <a:p>
-            <a:r>
-              <a:rPr lang="en-US" dirty="0" smtClean="0">
-                <a:solidFill>
-                  <a:srgbClr val="FF9900"/>
-                </a:solidFill>
-              </a:rPr>
+              <a:rPr lang="en-US" dirty="0" smtClean="0"/>
+              <a:t>Basic sounds during certain events</a:t>
+            </a:r>
+          </a:p>
+          <a:p>
+            <a:r>
+              <a:rPr lang="en-US" dirty="0" smtClean="0"/>
               <a:t>Chat</a:t>
             </a:r>
-            <a:endParaRPr lang="en-US" dirty="0" smtClean="0">
-              <a:solidFill>
-                <a:srgbClr val="FF9900"/>
-              </a:solidFill>
-            </a:endParaRPr>
-          </a:p>
-          <a:p>
-            <a:r>
-              <a:rPr lang="en-US" dirty="0" smtClean="0">
-                <a:solidFill>
-                  <a:srgbClr val="FF9900"/>
-                </a:solidFill>
-              </a:rPr>
+          </a:p>
+          <a:p>
+            <a:r>
+              <a:rPr lang="en-US" dirty="0" smtClean="0"/>
               <a:t>Games!!</a:t>
             </a:r>
-            <a:endParaRPr lang="en-US" dirty="0" smtClean="0">
-              <a:solidFill>
-                <a:srgbClr val="FF9900"/>
-              </a:solidFill>
-            </a:endParaRPr>
           </a:p>
           <a:p>
             <a:endParaRPr lang="en-US" dirty="0" smtClean="0">
@@ -5259,7 +5257,7 @@
 </p:sld>
 </file>
 
-<file path=ppt/slides/slide6.xml><?xml version="1.0" encoding="utf-8"?>
+<file path=ppt/slides/slide7.xml><?xml version="1.0" encoding="utf-8"?>
 <p:sld xmlns:a="http://schemas.openxmlformats.org/drawingml/2006/main" xmlns:r="http://schemas.openxmlformats.org/officeDocument/2006/relationships" xmlns:p="http://schemas.openxmlformats.org/presentationml/2006/main">
   <p:cSld>
     <p:spTree>
@@ -5562,7 +5560,7 @@
 </p:sld>
 </file>
 
-<file path=ppt/slides/slide7.xml><?xml version="1.0" encoding="utf-8"?>
+<file path=ppt/slides/slide8.xml><?xml version="1.0" encoding="utf-8"?>
 <p:sld xmlns:a="http://schemas.openxmlformats.org/drawingml/2006/main" xmlns:r="http://schemas.openxmlformats.org/officeDocument/2006/relationships" xmlns:p="http://schemas.openxmlformats.org/presentationml/2006/main">
   <p:cSld>
     <p:spTree>

</xml_diff>